<commit_message>
Gesuture, Guide Image Update
</commit_message>
<xml_diff>
--- a/GUI/Image/이미지제작용.pptx
+++ b/GUI/Image/이미지제작용.pptx
@@ -295,7 +295,7 @@
             <a:fld id="{7D595595-67CC-4EE9-B07E-555436DFB3F3}" type="datetimeFigureOut">
               <a:rPr lang="ko-KR" altLang="en-US" smtClean="0"/>
               <a:pPr/>
-              <a:t>2021-08-11</a:t>
+              <a:t>2021-08-19</a:t>
             </a:fld>
             <a:endParaRPr lang="ko-KR" altLang="en-US"/>
           </a:p>
@@ -462,7 +462,7 @@
             <a:fld id="{7D595595-67CC-4EE9-B07E-555436DFB3F3}" type="datetimeFigureOut">
               <a:rPr lang="ko-KR" altLang="en-US" smtClean="0"/>
               <a:pPr/>
-              <a:t>2021-08-11</a:t>
+              <a:t>2021-08-19</a:t>
             </a:fld>
             <a:endParaRPr lang="ko-KR" altLang="en-US"/>
           </a:p>
@@ -639,7 +639,7 @@
             <a:fld id="{7D595595-67CC-4EE9-B07E-555436DFB3F3}" type="datetimeFigureOut">
               <a:rPr lang="ko-KR" altLang="en-US" smtClean="0"/>
               <a:pPr/>
-              <a:t>2021-08-11</a:t>
+              <a:t>2021-08-19</a:t>
             </a:fld>
             <a:endParaRPr lang="ko-KR" altLang="en-US"/>
           </a:p>
@@ -806,7 +806,7 @@
             <a:fld id="{7D595595-67CC-4EE9-B07E-555436DFB3F3}" type="datetimeFigureOut">
               <a:rPr lang="ko-KR" altLang="en-US" smtClean="0"/>
               <a:pPr/>
-              <a:t>2021-08-11</a:t>
+              <a:t>2021-08-19</a:t>
             </a:fld>
             <a:endParaRPr lang="ko-KR" altLang="en-US"/>
           </a:p>
@@ -1049,7 +1049,7 @@
             <a:fld id="{7D595595-67CC-4EE9-B07E-555436DFB3F3}" type="datetimeFigureOut">
               <a:rPr lang="ko-KR" altLang="en-US" smtClean="0"/>
               <a:pPr/>
-              <a:t>2021-08-11</a:t>
+              <a:t>2021-08-19</a:t>
             </a:fld>
             <a:endParaRPr lang="ko-KR" altLang="en-US"/>
           </a:p>
@@ -1334,7 +1334,7 @@
             <a:fld id="{7D595595-67CC-4EE9-B07E-555436DFB3F3}" type="datetimeFigureOut">
               <a:rPr lang="ko-KR" altLang="en-US" smtClean="0"/>
               <a:pPr/>
-              <a:t>2021-08-11</a:t>
+              <a:t>2021-08-19</a:t>
             </a:fld>
             <a:endParaRPr lang="ko-KR" altLang="en-US"/>
           </a:p>
@@ -1753,7 +1753,7 @@
             <a:fld id="{7D595595-67CC-4EE9-B07E-555436DFB3F3}" type="datetimeFigureOut">
               <a:rPr lang="ko-KR" altLang="en-US" smtClean="0"/>
               <a:pPr/>
-              <a:t>2021-08-11</a:t>
+              <a:t>2021-08-19</a:t>
             </a:fld>
             <a:endParaRPr lang="ko-KR" altLang="en-US"/>
           </a:p>
@@ -1868,7 +1868,7 @@
             <a:fld id="{7D595595-67CC-4EE9-B07E-555436DFB3F3}" type="datetimeFigureOut">
               <a:rPr lang="ko-KR" altLang="en-US" smtClean="0"/>
               <a:pPr/>
-              <a:t>2021-08-11</a:t>
+              <a:t>2021-08-19</a:t>
             </a:fld>
             <a:endParaRPr lang="ko-KR" altLang="en-US"/>
           </a:p>
@@ -1960,7 +1960,7 @@
             <a:fld id="{7D595595-67CC-4EE9-B07E-555436DFB3F3}" type="datetimeFigureOut">
               <a:rPr lang="ko-KR" altLang="en-US" smtClean="0"/>
               <a:pPr/>
-              <a:t>2021-08-11</a:t>
+              <a:t>2021-08-19</a:t>
             </a:fld>
             <a:endParaRPr lang="ko-KR" altLang="en-US"/>
           </a:p>
@@ -2234,7 +2234,7 @@
             <a:fld id="{7D595595-67CC-4EE9-B07E-555436DFB3F3}" type="datetimeFigureOut">
               <a:rPr lang="ko-KR" altLang="en-US" smtClean="0"/>
               <a:pPr/>
-              <a:t>2021-08-11</a:t>
+              <a:t>2021-08-19</a:t>
             </a:fld>
             <a:endParaRPr lang="ko-KR" altLang="en-US"/>
           </a:p>
@@ -2484,7 +2484,7 @@
             <a:fld id="{7D595595-67CC-4EE9-B07E-555436DFB3F3}" type="datetimeFigureOut">
               <a:rPr lang="ko-KR" altLang="en-US" smtClean="0"/>
               <a:pPr/>
-              <a:t>2021-08-11</a:t>
+              <a:t>2021-08-19</a:t>
             </a:fld>
             <a:endParaRPr lang="ko-KR" altLang="en-US"/>
           </a:p>
@@ -2545,9 +2545,14 @@
 <p:sldMaster xmlns:a="http://schemas.openxmlformats.org/drawingml/2006/main" xmlns:r="http://schemas.openxmlformats.org/officeDocument/2006/relationships" xmlns:p="http://schemas.openxmlformats.org/presentationml/2006/main">
   <p:cSld>
     <p:bg>
-      <p:bgRef idx="1001">
-        <a:schemeClr val="bg1"/>
-      </p:bgRef>
+      <p:bgPr>
+        <a:solidFill>
+          <a:srgbClr val="ECECEC">
+            <a:alpha val="0"/>
+          </a:srgbClr>
+        </a:solidFill>
+        <a:effectLst/>
+      </p:bgPr>
     </p:bg>
     <p:spTree>
       <p:nvGrpSpPr>
@@ -2694,7 +2699,7 @@
             <a:fld id="{7D595595-67CC-4EE9-B07E-555436DFB3F3}" type="datetimeFigureOut">
               <a:rPr lang="ko-KR" altLang="en-US" smtClean="0"/>
               <a:pPr/>
-              <a:t>2021-08-11</a:t>
+              <a:t>2021-08-19</a:t>
             </a:fld>
             <a:endParaRPr lang="ko-KR" altLang="en-US"/>
           </a:p>
@@ -3289,6 +3294,32 @@
           </a:p>
         </p:txBody>
       </p:sp>
+      <p:pic>
+        <p:nvPicPr>
+          <p:cNvPr id="2" name="Picture 2" descr="C:\Users\user\PycharmProjects\working\GUI\Image_v2\모션제어_checked.png"/>
+          <p:cNvPicPr>
+            <a:picLocks noChangeAspect="1" noChangeArrowheads="1"/>
+          </p:cNvPicPr>
+          <p:nvPr/>
+        </p:nvPicPr>
+        <p:blipFill>
+          <a:blip r:embed="rId5"/>
+          <a:srcRect/>
+          <a:stretch>
+            <a:fillRect/>
+          </a:stretch>
+        </p:blipFill>
+        <p:spPr bwMode="auto">
+          <a:xfrm>
+            <a:off x="7493000" y="2978150"/>
+            <a:ext cx="1371600" cy="573088"/>
+          </a:xfrm>
+          <a:prstGeom prst="rect">
+            <a:avLst/>
+          </a:prstGeom>
+          <a:noFill/>
+        </p:spPr>
+      </p:pic>
     </p:spTree>
   </p:cSld>
   <p:clrMapOvr>
@@ -3671,40 +3702,312 @@
           </a:p>
         </p:txBody>
       </p:sp>
-      <p:pic>
-        <p:nvPicPr>
-          <p:cNvPr id="1026" name="Picture 2" descr="C:\Users\user\PycharmProjects\working\GUI\Image\guide_11.png"/>
-          <p:cNvPicPr>
-            <a:picLocks noChangeAspect="1" noChangeArrowheads="1"/>
-          </p:cNvPicPr>
+      <p:grpSp>
+        <p:nvGrpSpPr>
+          <p:cNvPr id="13" name="그룹 12"/>
+          <p:cNvGrpSpPr/>
           <p:nvPr/>
-        </p:nvPicPr>
-        <p:blipFill>
-          <a:blip r:embed="rId2"/>
-          <a:srcRect b="2500"/>
-          <a:stretch>
-            <a:fillRect/>
-          </a:stretch>
-        </p:blipFill>
-        <p:spPr bwMode="auto">
-          <a:xfrm>
-            <a:off x="455613" y="973138"/>
-            <a:ext cx="9680575" cy="5384820"/>
-          </a:xfrm>
-          <a:prstGeom prst="rect">
-            <a:avLst/>
-          </a:prstGeom>
-          <a:noFill/>
+        </p:nvGrpSpPr>
+        <p:grpSpPr>
+          <a:xfrm>
+            <a:off x="-3005138" y="-738188"/>
+            <a:ext cx="15154276" cy="8334376"/>
+            <a:chOff x="-3005138" y="-738188"/>
+            <a:chExt cx="15154276" cy="8334376"/>
+          </a:xfrm>
           <a:effectLst>
-            <a:outerShdw blurRad="88900" sx="102000" sy="102000" algn="ctr" rotWithShape="0">
+            <a:outerShdw blurRad="63500" sx="102000" sy="102000" algn="ctr" rotWithShape="0">
               <a:schemeClr val="bg1">
-                <a:lumMod val="65000"/>
+                <a:lumMod val="85000"/>
                 <a:alpha val="40000"/>
               </a:schemeClr>
             </a:outerShdw>
           </a:effectLst>
-        </p:spPr>
-      </p:pic>
+        </p:grpSpPr>
+        <p:pic>
+          <p:nvPicPr>
+            <p:cNvPr id="1027" name="Picture 3"/>
+            <p:cNvPicPr>
+              <a:picLocks noChangeAspect="1" noChangeArrowheads="1"/>
+            </p:cNvPicPr>
+            <p:nvPr/>
+          </p:nvPicPr>
+          <p:blipFill>
+            <a:blip r:embed="rId2"/>
+            <a:srcRect/>
+            <a:stretch>
+              <a:fillRect/>
+            </a:stretch>
+          </p:blipFill>
+          <p:spPr bwMode="auto">
+            <a:xfrm>
+              <a:off x="-3005138" y="-738188"/>
+              <a:ext cx="15154276" cy="8334376"/>
+            </a:xfrm>
+            <a:prstGeom prst="rect">
+              <a:avLst/>
+            </a:prstGeom>
+            <a:noFill/>
+            <a:ln w="9525">
+              <a:noFill/>
+              <a:miter lim="800000"/>
+              <a:headEnd/>
+              <a:tailEnd/>
+            </a:ln>
+            <a:effectLst/>
+          </p:spPr>
+        </p:pic>
+        <p:sp>
+          <p:nvSpPr>
+            <p:cNvPr id="6" name="직사각형 5"/>
+            <p:cNvSpPr/>
+            <p:nvPr/>
+          </p:nvSpPr>
+          <p:spPr>
+            <a:xfrm>
+              <a:off x="-2832152" y="-339752"/>
+              <a:ext cx="10501386" cy="7715304"/>
+            </a:xfrm>
+            <a:prstGeom prst="rect">
+              <a:avLst/>
+            </a:prstGeom>
+            <a:noFill/>
+            <a:ln w="38100">
+              <a:solidFill>
+                <a:srgbClr val="FF0000"/>
+              </a:solidFill>
+            </a:ln>
+          </p:spPr>
+          <p:style>
+            <a:lnRef idx="2">
+              <a:schemeClr val="accent1">
+                <a:shade val="50000"/>
+              </a:schemeClr>
+            </a:lnRef>
+            <a:fillRef idx="1">
+              <a:schemeClr val="accent1"/>
+            </a:fillRef>
+            <a:effectRef idx="0">
+              <a:schemeClr val="accent1"/>
+            </a:effectRef>
+            <a:fontRef idx="minor">
+              <a:schemeClr val="lt1"/>
+            </a:fontRef>
+          </p:style>
+          <p:txBody>
+            <a:bodyPr rtlCol="0" anchor="ctr"/>
+            <a:lstStyle/>
+            <a:p>
+              <a:pPr algn="ctr"/>
+              <a:endParaRPr lang="ko-KR" altLang="en-US"/>
+            </a:p>
+          </p:txBody>
+        </p:sp>
+        <p:sp>
+          <p:nvSpPr>
+            <p:cNvPr id="7" name="직사각형 6"/>
+            <p:cNvSpPr/>
+            <p:nvPr/>
+          </p:nvSpPr>
+          <p:spPr>
+            <a:xfrm>
+              <a:off x="8128024" y="1050908"/>
+              <a:ext cx="3929090" cy="4643470"/>
+            </a:xfrm>
+            <a:prstGeom prst="rect">
+              <a:avLst/>
+            </a:prstGeom>
+            <a:noFill/>
+            <a:ln w="38100">
+              <a:solidFill>
+                <a:srgbClr val="FF0000"/>
+              </a:solidFill>
+            </a:ln>
+          </p:spPr>
+          <p:style>
+            <a:lnRef idx="2">
+              <a:schemeClr val="accent1">
+                <a:shade val="50000"/>
+              </a:schemeClr>
+            </a:lnRef>
+            <a:fillRef idx="1">
+              <a:schemeClr val="accent1"/>
+            </a:fillRef>
+            <a:effectRef idx="0">
+              <a:schemeClr val="accent1"/>
+            </a:effectRef>
+            <a:fontRef idx="minor">
+              <a:schemeClr val="lt1"/>
+            </a:fontRef>
+          </p:style>
+          <p:txBody>
+            <a:bodyPr rtlCol="0" anchor="ctr"/>
+            <a:lstStyle/>
+            <a:p>
+              <a:pPr algn="ctr"/>
+              <a:endParaRPr lang="ko-KR" altLang="en-US"/>
+            </a:p>
+          </p:txBody>
+        </p:sp>
+        <p:sp>
+          <p:nvSpPr>
+            <p:cNvPr id="9" name="직사각형 8"/>
+            <p:cNvSpPr/>
+            <p:nvPr/>
+          </p:nvSpPr>
+          <p:spPr>
+            <a:xfrm>
+              <a:off x="8128024" y="5791208"/>
+              <a:ext cx="3929090" cy="1385906"/>
+            </a:xfrm>
+            <a:prstGeom prst="rect">
+              <a:avLst/>
+            </a:prstGeom>
+            <a:noFill/>
+            <a:ln w="38100">
+              <a:solidFill>
+                <a:srgbClr val="FF0000"/>
+              </a:solidFill>
+            </a:ln>
+          </p:spPr>
+          <p:style>
+            <a:lnRef idx="2">
+              <a:schemeClr val="accent1">
+                <a:shade val="50000"/>
+              </a:schemeClr>
+            </a:lnRef>
+            <a:fillRef idx="1">
+              <a:schemeClr val="accent1"/>
+            </a:fillRef>
+            <a:effectRef idx="0">
+              <a:schemeClr val="accent1"/>
+            </a:effectRef>
+            <a:fontRef idx="minor">
+              <a:schemeClr val="lt1"/>
+            </a:fontRef>
+          </p:style>
+          <p:txBody>
+            <a:bodyPr rtlCol="0" anchor="ctr"/>
+            <a:lstStyle/>
+            <a:p>
+              <a:pPr algn="ctr"/>
+              <a:endParaRPr lang="ko-KR" altLang="en-US"/>
+            </a:p>
+          </p:txBody>
+        </p:sp>
+        <p:sp>
+          <p:nvSpPr>
+            <p:cNvPr id="10" name="TextBox 9"/>
+            <p:cNvSpPr txBox="1"/>
+            <p:nvPr/>
+          </p:nvSpPr>
+          <p:spPr>
+            <a:xfrm>
+              <a:off x="-2841991" y="-382614"/>
+              <a:ext cx="492443" cy="461665"/>
+            </a:xfrm>
+            <a:prstGeom prst="rect">
+              <a:avLst/>
+            </a:prstGeom>
+            <a:noFill/>
+          </p:spPr>
+          <p:txBody>
+            <a:bodyPr wrap="none" rtlCol="0">
+              <a:spAutoFit/>
+            </a:bodyPr>
+            <a:lstStyle/>
+            <a:p>
+              <a:r>
+                <a:rPr lang="ko-KR" altLang="en-US" sz="2400" b="1" dirty="0" smtClean="0">
+                  <a:solidFill>
+                    <a:srgbClr val="FF0000"/>
+                  </a:solidFill>
+                </a:rPr>
+                <a:t>①</a:t>
+              </a:r>
+              <a:endParaRPr lang="ko-KR" altLang="en-US" sz="2400" b="1" dirty="0">
+                <a:solidFill>
+                  <a:srgbClr val="FF0000"/>
+                </a:solidFill>
+              </a:endParaRPr>
+            </a:p>
+          </p:txBody>
+        </p:sp>
+        <p:sp>
+          <p:nvSpPr>
+            <p:cNvPr id="11" name="직사각형 10"/>
+            <p:cNvSpPr/>
+            <p:nvPr/>
+          </p:nvSpPr>
+          <p:spPr>
+            <a:xfrm>
+              <a:off x="11598324" y="995346"/>
+              <a:ext cx="492443" cy="461665"/>
+            </a:xfrm>
+            <a:prstGeom prst="rect">
+              <a:avLst/>
+            </a:prstGeom>
+          </p:spPr>
+          <p:txBody>
+            <a:bodyPr wrap="none">
+              <a:spAutoFit/>
+            </a:bodyPr>
+            <a:lstStyle/>
+            <a:p>
+              <a:r>
+                <a:rPr lang="ko-KR" altLang="en-US" sz="2400" b="1" dirty="0" smtClean="0">
+                  <a:solidFill>
+                    <a:srgbClr val="FF0000"/>
+                  </a:solidFill>
+                </a:rPr>
+                <a:t>②</a:t>
+              </a:r>
+              <a:endParaRPr lang="ko-KR" altLang="en-US" sz="2400" b="1" dirty="0">
+                <a:solidFill>
+                  <a:srgbClr val="FF0000"/>
+                </a:solidFill>
+              </a:endParaRPr>
+            </a:p>
+          </p:txBody>
+        </p:sp>
+        <p:sp>
+          <p:nvSpPr>
+            <p:cNvPr id="12" name="직사각형 11"/>
+            <p:cNvSpPr/>
+            <p:nvPr/>
+          </p:nvSpPr>
+          <p:spPr>
+            <a:xfrm>
+              <a:off x="8072462" y="5715016"/>
+              <a:ext cx="492443" cy="461665"/>
+            </a:xfrm>
+            <a:prstGeom prst="rect">
+              <a:avLst/>
+            </a:prstGeom>
+          </p:spPr>
+          <p:txBody>
+            <a:bodyPr wrap="none">
+              <a:spAutoFit/>
+            </a:bodyPr>
+            <a:lstStyle/>
+            <a:p>
+              <a:r>
+                <a:rPr lang="ko-KR" altLang="en-US" sz="2400" b="1" dirty="0" smtClean="0">
+                  <a:solidFill>
+                    <a:srgbClr val="FF0000"/>
+                  </a:solidFill>
+                </a:rPr>
+                <a:t>③</a:t>
+              </a:r>
+              <a:endParaRPr lang="ko-KR" altLang="en-US" sz="2400" b="1" dirty="0">
+                <a:solidFill>
+                  <a:srgbClr val="FF0000"/>
+                </a:solidFill>
+              </a:endParaRPr>
+            </a:p>
+          </p:txBody>
+        </p:sp>
+      </p:grpSp>
     </p:spTree>
   </p:cSld>
   <p:clrMapOvr>
@@ -3716,6 +4019,14 @@
 <file path=ppt/slides/slide4.xml><?xml version="1.0" encoding="utf-8"?>
 <p:sld xmlns:a="http://schemas.openxmlformats.org/drawingml/2006/main" xmlns:r="http://schemas.openxmlformats.org/officeDocument/2006/relationships" xmlns:p="http://schemas.openxmlformats.org/presentationml/2006/main">
   <p:cSld>
+    <p:bg>
+      <p:bgPr>
+        <a:solidFill>
+          <a:srgbClr val="ECECEC"/>
+        </a:solidFill>
+        <a:effectLst/>
+      </p:bgPr>
+    </p:bg>
     <p:spTree>
       <p:nvGrpSpPr>
         <p:cNvPr id="1" name=""/>
@@ -3766,7 +4077,7 @@
         </p:blipFill>
         <p:spPr bwMode="auto">
           <a:xfrm rot="10800000" flipH="1">
-            <a:off x="3071802" y="4429132"/>
+            <a:off x="-2428924" y="4714884"/>
             <a:ext cx="500066" cy="642942"/>
           </a:xfrm>
           <a:prstGeom prst="rect">
@@ -3801,7 +4112,7 @@
         </p:blipFill>
         <p:spPr bwMode="auto">
           <a:xfrm flipH="1">
-            <a:off x="3071802" y="2600305"/>
+            <a:off x="-2428924" y="2886057"/>
             <a:ext cx="571504" cy="642923"/>
           </a:xfrm>
           <a:prstGeom prst="rect">
@@ -3834,8 +4145,8 @@
         </p:blipFill>
         <p:spPr bwMode="auto">
           <a:xfrm>
-            <a:off x="1928794" y="2500306"/>
-            <a:ext cx="642942" cy="814379"/>
+            <a:off x="1357290" y="4143380"/>
+            <a:ext cx="1143008" cy="1447785"/>
           </a:xfrm>
           <a:prstGeom prst="rect">
             <a:avLst/>
@@ -3867,7 +4178,7 @@
         </p:blipFill>
         <p:spPr bwMode="auto">
           <a:xfrm>
-            <a:off x="3071802" y="3500438"/>
+            <a:off x="-2428924" y="3786190"/>
             <a:ext cx="571504" cy="642942"/>
           </a:xfrm>
           <a:prstGeom prst="rect">
@@ -3891,7 +4202,7 @@
         </p:nvSpPr>
         <p:spPr>
           <a:xfrm>
-            <a:off x="2643174" y="2786058"/>
+            <a:off x="-2857552" y="3071810"/>
             <a:ext cx="357190" cy="357190"/>
           </a:xfrm>
           <a:prstGeom prst="mathPlus">
@@ -3925,32 +4236,6 @@
       </p:sp>
       <p:pic>
         <p:nvPicPr>
-          <p:cNvPr id="1026" name="Picture 2" descr="C:\Users\user\PycharmProjects\working\GUI\Image\stop-icon-128.png"/>
-          <p:cNvPicPr>
-            <a:picLocks noChangeAspect="1" noChangeArrowheads="1"/>
-          </p:cNvPicPr>
-          <p:nvPr/>
-        </p:nvPicPr>
-        <p:blipFill>
-          <a:blip r:embed="rId3"/>
-          <a:srcRect/>
-          <a:stretch>
-            <a:fillRect/>
-          </a:stretch>
-        </p:blipFill>
-        <p:spPr bwMode="auto">
-          <a:xfrm>
-            <a:off x="6715140" y="2643182"/>
-            <a:ext cx="1219200" cy="1219200"/>
-          </a:xfrm>
-          <a:prstGeom prst="rect">
-            <a:avLst/>
-          </a:prstGeom>
-          <a:noFill/>
-        </p:spPr>
-      </p:pic>
-      <p:pic>
-        <p:nvPicPr>
           <p:cNvPr id="4" name="Picture 5" descr="C:\Users\user\PycharmProjects\working\GUI\Image\refresh.png"/>
           <p:cNvPicPr>
             <a:picLocks noChangeAspect="1" noChangeArrowheads="1"/>
@@ -3958,7 +4243,7 @@
           <p:nvPr/>
         </p:nvPicPr>
         <p:blipFill>
-          <a:blip r:embed="rId4">
+          <a:blip r:embed="rId3">
             <a:lum bright="-10000"/>
           </a:blip>
           <a:srcRect/>
@@ -3968,7 +4253,7 @@
         </p:blipFill>
         <p:spPr bwMode="auto">
           <a:xfrm>
-            <a:off x="5643570" y="3929066"/>
+            <a:off x="928662" y="285728"/>
             <a:ext cx="1800000" cy="1800000"/>
           </a:xfrm>
           <a:prstGeom prst="rect">
@@ -3985,7 +4270,7 @@
         </p:nvCxnSpPr>
         <p:spPr>
           <a:xfrm>
-            <a:off x="3730496" y="2928934"/>
+            <a:off x="-1770230" y="3214686"/>
             <a:ext cx="270000" cy="1588"/>
           </a:xfrm>
           <a:prstGeom prst="straightConnector1">
@@ -4021,7 +4306,7 @@
         </p:nvSpPr>
         <p:spPr>
           <a:xfrm flipV="1">
-            <a:off x="4214810" y="2643182"/>
+            <a:off x="-1285916" y="2928934"/>
             <a:ext cx="428628" cy="500066"/>
           </a:xfrm>
           <a:prstGeom prst="downArrow">
@@ -4076,7 +4361,7 @@
         </p:blipFill>
         <p:spPr bwMode="auto">
           <a:xfrm>
-            <a:off x="1928794" y="3400439"/>
+            <a:off x="-3571932" y="3686191"/>
             <a:ext cx="642942" cy="814379"/>
           </a:xfrm>
           <a:prstGeom prst="rect">
@@ -4100,7 +4385,7 @@
         </p:nvSpPr>
         <p:spPr>
           <a:xfrm>
-            <a:off x="2643174" y="3686191"/>
+            <a:off x="-2857552" y="3971943"/>
             <a:ext cx="357190" cy="357190"/>
           </a:xfrm>
           <a:prstGeom prst="mathPlus">
@@ -4140,7 +4425,7 @@
         </p:nvCxnSpPr>
         <p:spPr>
           <a:xfrm>
-            <a:off x="3730496" y="3829067"/>
+            <a:off x="-1770230" y="4114819"/>
             <a:ext cx="270000" cy="1588"/>
           </a:xfrm>
           <a:prstGeom prst="straightConnector1">
@@ -4185,7 +4470,7 @@
         </p:blipFill>
         <p:spPr bwMode="auto">
           <a:xfrm>
-            <a:off x="1928794" y="4257695"/>
+            <a:off x="-3571932" y="4543447"/>
             <a:ext cx="642942" cy="814379"/>
           </a:xfrm>
           <a:prstGeom prst="rect">
@@ -4209,7 +4494,7 @@
         </p:nvSpPr>
         <p:spPr>
           <a:xfrm>
-            <a:off x="2643174" y="4543447"/>
+            <a:off x="-2857552" y="4829199"/>
             <a:ext cx="357190" cy="357190"/>
           </a:xfrm>
           <a:prstGeom prst="mathPlus">
@@ -4249,7 +4534,7 @@
         </p:nvCxnSpPr>
         <p:spPr>
           <a:xfrm>
-            <a:off x="3730496" y="4686323"/>
+            <a:off x="-1770230" y="4972075"/>
             <a:ext cx="270000" cy="1588"/>
           </a:xfrm>
           <a:prstGeom prst="straightConnector1">
@@ -4285,7 +4570,7 @@
         </p:nvSpPr>
         <p:spPr>
           <a:xfrm>
-            <a:off x="4286248" y="3714752"/>
+            <a:off x="-1214478" y="4000504"/>
             <a:ext cx="285752" cy="285752"/>
           </a:xfrm>
           <a:prstGeom prst="rect">
@@ -4331,7 +4616,7 @@
         </p:nvSpPr>
         <p:spPr>
           <a:xfrm>
-            <a:off x="4214810" y="4500570"/>
+            <a:off x="-1285916" y="4786322"/>
             <a:ext cx="428628" cy="500066"/>
           </a:xfrm>
           <a:prstGeom prst="downArrow">
@@ -4369,11 +4654,488 @@
           </a:p>
         </p:txBody>
       </p:sp>
+      <p:sp>
+        <p:nvSpPr>
+          <p:cNvPr id="25" name="TextBox 24"/>
+          <p:cNvSpPr txBox="1"/>
+          <p:nvPr/>
+        </p:nvSpPr>
+        <p:spPr>
+          <a:xfrm>
+            <a:off x="642910" y="3571876"/>
+            <a:ext cx="1579279" cy="369332"/>
+          </a:xfrm>
+          <a:prstGeom prst="rect">
+            <a:avLst/>
+          </a:prstGeom>
+          <a:noFill/>
+        </p:spPr>
+        <p:txBody>
+          <a:bodyPr wrap="none" rtlCol="0">
+            <a:spAutoFit/>
+          </a:bodyPr>
+          <a:lstStyle/>
+          <a:p>
+            <a:pPr algn="ctr"/>
+            <a:r>
+              <a:rPr lang="ko-KR" altLang="en-US" dirty="0" smtClean="0">
+                <a:solidFill>
+                  <a:srgbClr val="FF0000"/>
+                </a:solidFill>
+                <a:latin typeface="에스코어 드림 6 Bold" pitchFamily="34" charset="-127"/>
+                <a:ea typeface="에스코어 드림 6 Bold" pitchFamily="34" charset="-127"/>
+              </a:rPr>
+              <a:t>오른손</a:t>
+            </a:r>
+            <a:r>
+              <a:rPr lang="ko-KR" altLang="en-US" dirty="0" smtClean="0">
+                <a:latin typeface="에스코어 드림 6 Bold" pitchFamily="34" charset="-127"/>
+                <a:ea typeface="에스코어 드림 6 Bold" pitchFamily="34" charset="-127"/>
+              </a:rPr>
+              <a:t>을</a:t>
+            </a:r>
+            <a:r>
+              <a:rPr lang="en-US" altLang="ko-KR" dirty="0" smtClean="0">
+                <a:latin typeface="에스코어 드림 6 Bold" pitchFamily="34" charset="-127"/>
+                <a:ea typeface="에스코어 드림 6 Bold" pitchFamily="34" charset="-127"/>
+              </a:rPr>
+              <a:t> </a:t>
+            </a:r>
+            <a:r>
+              <a:rPr lang="ko-KR" altLang="en-US" dirty="0" smtClean="0">
+                <a:latin typeface="에스코어 드림 6 Bold" pitchFamily="34" charset="-127"/>
+                <a:ea typeface="에스코어 드림 6 Bold" pitchFamily="34" charset="-127"/>
+              </a:rPr>
+              <a:t>들어</a:t>
+            </a:r>
+            <a:endParaRPr lang="ko-KR" altLang="en-US" dirty="0">
+              <a:latin typeface="에스코어 드림 6 Bold" pitchFamily="34" charset="-127"/>
+              <a:ea typeface="에스코어 드림 6 Bold" pitchFamily="34" charset="-127"/>
+            </a:endParaRPr>
+          </a:p>
+        </p:txBody>
+      </p:sp>
+      <p:sp>
+        <p:nvSpPr>
+          <p:cNvPr id="38" name="TextBox 37"/>
+          <p:cNvSpPr txBox="1"/>
+          <p:nvPr/>
+        </p:nvSpPr>
+        <p:spPr>
+          <a:xfrm>
+            <a:off x="4950281" y="3629033"/>
+            <a:ext cx="1726755" cy="400110"/>
+          </a:xfrm>
+          <a:prstGeom prst="rect">
+            <a:avLst/>
+          </a:prstGeom>
+          <a:noFill/>
+        </p:spPr>
+        <p:txBody>
+          <a:bodyPr wrap="none" rtlCol="0">
+            <a:spAutoFit/>
+          </a:bodyPr>
+          <a:lstStyle/>
+          <a:p>
+            <a:r>
+              <a:rPr lang="ko-KR" altLang="en-US" sz="2000" dirty="0" smtClean="0">
+                <a:latin typeface="에스코어 드림 6 Bold" pitchFamily="34" charset="-127"/>
+                <a:ea typeface="에스코어 드림 6 Bold" pitchFamily="34" charset="-127"/>
+              </a:rPr>
+              <a:t>등받이 세우기</a:t>
+            </a:r>
+            <a:endParaRPr lang="ko-KR" altLang="en-US" sz="2000" dirty="0">
+              <a:latin typeface="에스코어 드림 6 Bold" pitchFamily="34" charset="-127"/>
+              <a:ea typeface="에스코어 드림 6 Bold" pitchFamily="34" charset="-127"/>
+            </a:endParaRPr>
+          </a:p>
+        </p:txBody>
+      </p:sp>
+      <p:sp>
+        <p:nvSpPr>
+          <p:cNvPr id="39" name="TextBox 38"/>
+          <p:cNvSpPr txBox="1"/>
+          <p:nvPr/>
+        </p:nvSpPr>
+        <p:spPr>
+          <a:xfrm>
+            <a:off x="4962985" y="5537125"/>
+            <a:ext cx="1726755" cy="400110"/>
+          </a:xfrm>
+          <a:prstGeom prst="rect">
+            <a:avLst/>
+          </a:prstGeom>
+          <a:noFill/>
+        </p:spPr>
+        <p:txBody>
+          <a:bodyPr wrap="none" rtlCol="0">
+            <a:spAutoFit/>
+          </a:bodyPr>
+          <a:lstStyle/>
+          <a:p>
+            <a:r>
+              <a:rPr lang="ko-KR" altLang="en-US" sz="2000" dirty="0" smtClean="0">
+                <a:latin typeface="에스코어 드림 6 Bold" pitchFamily="34" charset="-127"/>
+                <a:ea typeface="에스코어 드림 6 Bold" pitchFamily="34" charset="-127"/>
+              </a:rPr>
+              <a:t>등받이 눕히기</a:t>
+            </a:r>
+            <a:endParaRPr lang="ko-KR" altLang="en-US" sz="2000" dirty="0">
+              <a:latin typeface="에스코어 드림 6 Bold" pitchFamily="34" charset="-127"/>
+              <a:ea typeface="에스코어 드림 6 Bold" pitchFamily="34" charset="-127"/>
+            </a:endParaRPr>
+          </a:p>
+        </p:txBody>
+      </p:sp>
+      <p:sp>
+        <p:nvSpPr>
+          <p:cNvPr id="40" name="TextBox 39"/>
+          <p:cNvSpPr txBox="1"/>
+          <p:nvPr/>
+        </p:nvSpPr>
+        <p:spPr>
+          <a:xfrm>
+            <a:off x="5475294" y="4591004"/>
+            <a:ext cx="678391" cy="400110"/>
+          </a:xfrm>
+          <a:prstGeom prst="rect">
+            <a:avLst/>
+          </a:prstGeom>
+          <a:noFill/>
+        </p:spPr>
+        <p:txBody>
+          <a:bodyPr wrap="none" rtlCol="0">
+            <a:spAutoFit/>
+          </a:bodyPr>
+          <a:lstStyle/>
+          <a:p>
+            <a:r>
+              <a:rPr lang="ko-KR" altLang="en-US" sz="2000" dirty="0" smtClean="0">
+                <a:latin typeface="에스코어 드림 6 Bold" pitchFamily="34" charset="-127"/>
+                <a:ea typeface="에스코어 드림 6 Bold" pitchFamily="34" charset="-127"/>
+              </a:rPr>
+              <a:t>멈춤</a:t>
+            </a:r>
+            <a:endParaRPr lang="ko-KR" altLang="en-US" sz="2000" dirty="0">
+              <a:latin typeface="에스코어 드림 6 Bold" pitchFamily="34" charset="-127"/>
+              <a:ea typeface="에스코어 드림 6 Bold" pitchFamily="34" charset="-127"/>
+            </a:endParaRPr>
+          </a:p>
+        </p:txBody>
+      </p:sp>
+      <p:sp>
+        <p:nvSpPr>
+          <p:cNvPr id="31" name="오른쪽 화살표 30"/>
+          <p:cNvSpPr/>
+          <p:nvPr/>
+        </p:nvSpPr>
+        <p:spPr>
+          <a:xfrm>
+            <a:off x="1643042" y="1857364"/>
+            <a:ext cx="714380" cy="500066"/>
+          </a:xfrm>
+          <a:prstGeom prst="rightArrow">
+            <a:avLst/>
+          </a:prstGeom>
+          <a:solidFill>
+            <a:schemeClr val="bg1">
+              <a:lumMod val="85000"/>
+            </a:schemeClr>
+          </a:solidFill>
+          <a:ln>
+            <a:noFill/>
+          </a:ln>
+        </p:spPr>
+        <p:style>
+          <a:lnRef idx="2">
+            <a:schemeClr val="accent1">
+              <a:shade val="50000"/>
+            </a:schemeClr>
+          </a:lnRef>
+          <a:fillRef idx="1">
+            <a:schemeClr val="accent1"/>
+          </a:fillRef>
+          <a:effectRef idx="0">
+            <a:schemeClr val="accent1"/>
+          </a:effectRef>
+          <a:fontRef idx="minor">
+            <a:schemeClr val="lt1"/>
+          </a:fontRef>
+        </p:style>
+        <p:txBody>
+          <a:bodyPr rtlCol="0" anchor="ctr"/>
+          <a:lstStyle/>
+          <a:p>
+            <a:pPr algn="ctr"/>
+            <a:endParaRPr lang="ko-KR" altLang="en-US"/>
+          </a:p>
+        </p:txBody>
+      </p:sp>
+      <p:sp>
+        <p:nvSpPr>
+          <p:cNvPr id="43" name="TextBox 42"/>
+          <p:cNvSpPr txBox="1"/>
+          <p:nvPr/>
+        </p:nvSpPr>
+        <p:spPr>
+          <a:xfrm>
+            <a:off x="3686172" y="2571744"/>
+            <a:ext cx="3493265" cy="461665"/>
+          </a:xfrm>
+          <a:prstGeom prst="rect">
+            <a:avLst/>
+          </a:prstGeom>
+          <a:noFill/>
+        </p:spPr>
+        <p:txBody>
+          <a:bodyPr wrap="none" rtlCol="0">
+            <a:spAutoFit/>
+          </a:bodyPr>
+          <a:lstStyle/>
+          <a:p>
+            <a:pPr algn="ctr"/>
+            <a:r>
+              <a:rPr lang="ko-KR" altLang="en-US" sz="2400" dirty="0" smtClean="0">
+                <a:solidFill>
+                  <a:srgbClr val="C00000"/>
+                </a:solidFill>
+                <a:latin typeface="에스코어 드림 6 Bold" pitchFamily="34" charset="-127"/>
+                <a:ea typeface="에스코어 드림 6 Bold" pitchFamily="34" charset="-127"/>
+              </a:rPr>
+              <a:t>제스처 제어 </a:t>
+            </a:r>
+            <a:r>
+              <a:rPr lang="ko-KR" altLang="en-US" sz="2400" dirty="0" smtClean="0">
+                <a:solidFill>
+                  <a:srgbClr val="C00000"/>
+                </a:solidFill>
+                <a:latin typeface="에스코어 드림 6 Bold" pitchFamily="34" charset="-127"/>
+                <a:ea typeface="에스코어 드림 6 Bold" pitchFamily="34" charset="-127"/>
+              </a:rPr>
+              <a:t>모드 실행중</a:t>
+            </a:r>
+            <a:endParaRPr lang="ko-KR" altLang="en-US" sz="2400" dirty="0">
+              <a:solidFill>
+                <a:srgbClr val="C00000"/>
+              </a:solidFill>
+              <a:latin typeface="에스코어 드림 6 Bold" pitchFamily="34" charset="-127"/>
+              <a:ea typeface="에스코어 드림 6 Bold" pitchFamily="34" charset="-127"/>
+            </a:endParaRPr>
+          </a:p>
+        </p:txBody>
+      </p:sp>
+      <p:sp>
+        <p:nvSpPr>
+          <p:cNvPr id="32" name="TextBox 31"/>
+          <p:cNvSpPr txBox="1"/>
+          <p:nvPr/>
+        </p:nvSpPr>
+        <p:spPr>
+          <a:xfrm>
+            <a:off x="815948" y="5783065"/>
+            <a:ext cx="2234907" cy="646331"/>
+          </a:xfrm>
+          <a:prstGeom prst="rect">
+            <a:avLst/>
+          </a:prstGeom>
+          <a:noFill/>
+        </p:spPr>
+        <p:txBody>
+          <a:bodyPr wrap="none" rtlCol="0">
+            <a:spAutoFit/>
+          </a:bodyPr>
+          <a:lstStyle/>
+          <a:p>
+            <a:pPr algn="ctr"/>
+            <a:r>
+              <a:rPr lang="ko-KR" altLang="en-US" dirty="0" smtClean="0">
+                <a:latin typeface="에스코어 드림 6 Bold" pitchFamily="34" charset="-127"/>
+                <a:ea typeface="에스코어 드림 6 Bold" pitchFamily="34" charset="-127"/>
+              </a:rPr>
+              <a:t>포즈를 취한 후</a:t>
+            </a:r>
+            <a:r>
+              <a:rPr lang="en-US" altLang="ko-KR" dirty="0" smtClean="0">
+                <a:latin typeface="에스코어 드림 6 Bold" pitchFamily="34" charset="-127"/>
+                <a:ea typeface="에스코어 드림 6 Bold" pitchFamily="34" charset="-127"/>
+              </a:rPr>
+              <a:t>,</a:t>
+            </a:r>
+          </a:p>
+          <a:p>
+            <a:pPr algn="ctr"/>
+            <a:r>
+              <a:rPr lang="en-US" altLang="ko-KR" dirty="0" smtClean="0">
+                <a:latin typeface="에스코어 드림 6 Bold" pitchFamily="34" charset="-127"/>
+                <a:ea typeface="에스코어 드림 6 Bold" pitchFamily="34" charset="-127"/>
+              </a:rPr>
+              <a:t>2</a:t>
+            </a:r>
+            <a:r>
+              <a:rPr lang="ko-KR" altLang="en-US" dirty="0" smtClean="0">
+                <a:latin typeface="에스코어 드림 6 Bold" pitchFamily="34" charset="-127"/>
+                <a:ea typeface="에스코어 드림 6 Bold" pitchFamily="34" charset="-127"/>
+              </a:rPr>
+              <a:t>초간 유지해주세요</a:t>
+            </a:r>
+            <a:r>
+              <a:rPr lang="en-US" altLang="ko-KR" dirty="0" smtClean="0">
+                <a:latin typeface="에스코어 드림 5 Medium" pitchFamily="34" charset="-127"/>
+                <a:ea typeface="에스코어 드림 5 Medium" pitchFamily="34" charset="-127"/>
+              </a:rPr>
+              <a:t>.</a:t>
+            </a:r>
+            <a:endParaRPr lang="ko-KR" altLang="en-US" dirty="0">
+              <a:latin typeface="에스코어 드림 5 Medium" pitchFamily="34" charset="-127"/>
+              <a:ea typeface="에스코어 드림 5 Medium" pitchFamily="34" charset="-127"/>
+            </a:endParaRPr>
+          </a:p>
+        </p:txBody>
+      </p:sp>
+      <p:pic>
+        <p:nvPicPr>
+          <p:cNvPr id="1026" name="Picture 2"/>
+          <p:cNvPicPr>
+            <a:picLocks noChangeAspect="1" noChangeArrowheads="1"/>
+          </p:cNvPicPr>
+          <p:nvPr/>
+        </p:nvPicPr>
+        <p:blipFill>
+          <a:blip r:embed="rId4"/>
+          <a:srcRect/>
+          <a:stretch>
+            <a:fillRect/>
+          </a:stretch>
+        </p:blipFill>
+        <p:spPr bwMode="auto">
+          <a:xfrm>
+            <a:off x="1357290" y="4143380"/>
+            <a:ext cx="1152525" cy="1457325"/>
+          </a:xfrm>
+          <a:prstGeom prst="rect">
+            <a:avLst/>
+          </a:prstGeom>
+          <a:noFill/>
+          <a:ln w="9525">
+            <a:noFill/>
+            <a:miter lim="800000"/>
+            <a:headEnd/>
+            <a:tailEnd/>
+          </a:ln>
+          <a:effectLst/>
+        </p:spPr>
+      </p:pic>
+      <p:pic>
+        <p:nvPicPr>
+          <p:cNvPr id="3" name="Picture 3"/>
+          <p:cNvPicPr>
+            <a:picLocks noChangeAspect="1" noChangeArrowheads="1"/>
+          </p:cNvPicPr>
+          <p:nvPr/>
+        </p:nvPicPr>
+        <p:blipFill>
+          <a:blip r:embed="rId5"/>
+          <a:srcRect/>
+          <a:stretch>
+            <a:fillRect/>
+          </a:stretch>
+        </p:blipFill>
+        <p:spPr bwMode="auto">
+          <a:xfrm>
+            <a:off x="4013196" y="3271843"/>
+            <a:ext cx="847725" cy="942975"/>
+          </a:xfrm>
+          <a:prstGeom prst="rect">
+            <a:avLst/>
+          </a:prstGeom>
+          <a:noFill/>
+          <a:ln w="9525">
+            <a:noFill/>
+            <a:miter lim="800000"/>
+            <a:headEnd/>
+            <a:tailEnd/>
+          </a:ln>
+          <a:effectLst/>
+        </p:spPr>
+      </p:pic>
+      <p:pic>
+        <p:nvPicPr>
+          <p:cNvPr id="1028" name="Picture 4"/>
+          <p:cNvPicPr>
+            <a:picLocks noChangeAspect="1" noChangeArrowheads="1"/>
+          </p:cNvPicPr>
+          <p:nvPr/>
+        </p:nvPicPr>
+        <p:blipFill>
+          <a:blip r:embed="rId6"/>
+          <a:srcRect/>
+          <a:stretch>
+            <a:fillRect/>
+          </a:stretch>
+        </p:blipFill>
+        <p:spPr bwMode="auto">
+          <a:xfrm>
+            <a:off x="3992565" y="4233875"/>
+            <a:ext cx="847725" cy="942975"/>
+          </a:xfrm>
+          <a:prstGeom prst="rect">
+            <a:avLst/>
+          </a:prstGeom>
+          <a:noFill/>
+          <a:ln w="9525">
+            <a:noFill/>
+            <a:miter lim="800000"/>
+            <a:headEnd/>
+            <a:tailEnd/>
+          </a:ln>
+          <a:effectLst/>
+        </p:spPr>
+      </p:pic>
+      <p:pic>
+        <p:nvPicPr>
+          <p:cNvPr id="5" name="Picture 5"/>
+          <p:cNvPicPr>
+            <a:picLocks noChangeAspect="1" noChangeArrowheads="1"/>
+          </p:cNvPicPr>
+          <p:nvPr/>
+        </p:nvPicPr>
+        <p:blipFill>
+          <a:blip r:embed="rId7"/>
+          <a:srcRect/>
+          <a:stretch>
+            <a:fillRect/>
+          </a:stretch>
+        </p:blipFill>
+        <p:spPr bwMode="auto">
+          <a:xfrm>
+            <a:off x="4058777" y="5273688"/>
+            <a:ext cx="742950" cy="942975"/>
+          </a:xfrm>
+          <a:prstGeom prst="rect">
+            <a:avLst/>
+          </a:prstGeom>
+          <a:noFill/>
+          <a:ln w="9525">
+            <a:noFill/>
+            <a:miter lim="800000"/>
+            <a:headEnd/>
+            <a:tailEnd/>
+          </a:ln>
+          <a:effectLst/>
+        </p:spPr>
+      </p:pic>
     </p:spTree>
   </p:cSld>
   <p:clrMapOvr>
     <a:masterClrMapping/>
   </p:clrMapOvr>
+  <p:timing>
+    <p:tnLst>
+      <p:par>
+        <p:cTn id="1" dur="indefinite" restart="never" nodeType="tmRoot"/>
+      </p:par>
+    </p:tnLst>
+  </p:timing>
 </p:sld>
 </file>
 
@@ -4428,15 +5190,178 @@
           <a:bodyPr/>
           <a:lstStyle/>
           <a:p>
-            <a:endParaRPr lang="ko-KR" altLang="en-US"/>
-          </a:p>
-        </p:txBody>
-      </p:sp>
+            <a:endParaRPr lang="ko-KR" altLang="en-US" dirty="0"/>
+          </a:p>
+        </p:txBody>
+      </p:sp>
+      <p:pic>
+        <p:nvPicPr>
+          <p:cNvPr id="2050" name="Picture 2" descr="C:\Users\user\PycharmProjects\working\GUI\Image_v2\모션제어.png"/>
+          <p:cNvPicPr>
+            <a:picLocks noChangeAspect="1" noChangeArrowheads="1"/>
+          </p:cNvPicPr>
+          <p:nvPr/>
+        </p:nvPicPr>
+        <p:blipFill>
+          <a:blip r:embed="rId2"/>
+          <a:srcRect/>
+          <a:stretch>
+            <a:fillRect/>
+          </a:stretch>
+        </p:blipFill>
+        <p:spPr bwMode="auto">
+          <a:xfrm>
+            <a:off x="1714480" y="2714620"/>
+            <a:ext cx="1371600" cy="573088"/>
+          </a:xfrm>
+          <a:prstGeom prst="rect">
+            <a:avLst/>
+          </a:prstGeom>
+          <a:noFill/>
+        </p:spPr>
+      </p:pic>
+      <p:pic>
+        <p:nvPicPr>
+          <p:cNvPr id="2051" name="Picture 3" descr="C:\Users\user\PycharmProjects\working\GUI\Image_v2\터치제어.png"/>
+          <p:cNvPicPr>
+            <a:picLocks noChangeAspect="1" noChangeArrowheads="1"/>
+          </p:cNvPicPr>
+          <p:nvPr/>
+        </p:nvPicPr>
+        <p:blipFill>
+          <a:blip r:embed="rId3"/>
+          <a:srcRect/>
+          <a:stretch>
+            <a:fillRect/>
+          </a:stretch>
+        </p:blipFill>
+        <p:spPr bwMode="auto">
+          <a:xfrm>
+            <a:off x="1714480" y="2714620"/>
+            <a:ext cx="1371600" cy="573088"/>
+          </a:xfrm>
+          <a:prstGeom prst="rect">
+            <a:avLst/>
+          </a:prstGeom>
+          <a:noFill/>
+        </p:spPr>
+      </p:pic>
+      <p:pic>
+        <p:nvPicPr>
+          <p:cNvPr id="2052" name="Picture 4" descr="C:\Users\user\PycharmProjects\working\GUI\Image_v2\모션제어.png"/>
+          <p:cNvPicPr>
+            <a:picLocks noChangeAspect="1" noChangeArrowheads="1"/>
+          </p:cNvPicPr>
+          <p:nvPr/>
+        </p:nvPicPr>
+        <p:blipFill>
+          <a:blip r:embed="rId2"/>
+          <a:srcRect/>
+          <a:stretch>
+            <a:fillRect/>
+          </a:stretch>
+        </p:blipFill>
+        <p:spPr bwMode="auto">
+          <a:xfrm>
+            <a:off x="3286116" y="2714620"/>
+            <a:ext cx="1371600" cy="573088"/>
+          </a:xfrm>
+          <a:prstGeom prst="rect">
+            <a:avLst/>
+          </a:prstGeom>
+          <a:noFill/>
+        </p:spPr>
+      </p:pic>
+      <p:pic>
+        <p:nvPicPr>
+          <p:cNvPr id="2053" name="Picture 5" descr="C:\Users\user\PycharmProjects\working\GUI\Image_v2\qmark.png"/>
+          <p:cNvPicPr>
+            <a:picLocks noChangeAspect="1" noChangeArrowheads="1"/>
+          </p:cNvPicPr>
+          <p:nvPr/>
+        </p:nvPicPr>
+        <p:blipFill>
+          <a:blip r:embed="rId4"/>
+          <a:srcRect/>
+          <a:stretch>
+            <a:fillRect/>
+          </a:stretch>
+        </p:blipFill>
+        <p:spPr bwMode="auto">
+          <a:xfrm>
+            <a:off x="1785918" y="4143380"/>
+            <a:ext cx="896938" cy="901700"/>
+          </a:xfrm>
+          <a:prstGeom prst="rect">
+            <a:avLst/>
+          </a:prstGeom>
+          <a:noFill/>
+        </p:spPr>
+      </p:pic>
+      <p:pic>
+        <p:nvPicPr>
+          <p:cNvPr id="2054" name="Picture 6" descr="C:\Users\user\PycharmProjects\working\GUI\Image_v2\refresh.png"/>
+          <p:cNvPicPr>
+            <a:picLocks noChangeAspect="1" noChangeArrowheads="1"/>
+          </p:cNvPicPr>
+          <p:nvPr/>
+        </p:nvPicPr>
+        <p:blipFill>
+          <a:blip r:embed="rId5"/>
+          <a:srcRect/>
+          <a:stretch>
+            <a:fillRect/>
+          </a:stretch>
+        </p:blipFill>
+        <p:spPr bwMode="auto">
+          <a:xfrm>
+            <a:off x="2857488" y="4143380"/>
+            <a:ext cx="901700" cy="901700"/>
+          </a:xfrm>
+          <a:prstGeom prst="rect">
+            <a:avLst/>
+          </a:prstGeom>
+          <a:noFill/>
+        </p:spPr>
+      </p:pic>
+      <p:pic>
+        <p:nvPicPr>
+          <p:cNvPr id="2055" name="Picture 7" descr="C:\Users\user\PycharmProjects\working\GUI\Image_v2\power.png"/>
+          <p:cNvPicPr>
+            <a:picLocks noChangeAspect="1" noChangeArrowheads="1"/>
+          </p:cNvPicPr>
+          <p:nvPr/>
+        </p:nvPicPr>
+        <p:blipFill>
+          <a:blip r:embed="rId6"/>
+          <a:srcRect/>
+          <a:stretch>
+            <a:fillRect/>
+          </a:stretch>
+        </p:blipFill>
+        <p:spPr bwMode="auto">
+          <a:xfrm>
+            <a:off x="5857884" y="3500438"/>
+            <a:ext cx="1798638" cy="1798638"/>
+          </a:xfrm>
+          <a:prstGeom prst="rect">
+            <a:avLst/>
+          </a:prstGeom>
+          <a:noFill/>
+        </p:spPr>
+      </p:pic>
     </p:spTree>
   </p:cSld>
   <p:clrMapOvr>
     <a:masterClrMapping/>
   </p:clrMapOvr>
+  <p:timing>
+    <p:tnLst>
+      <p:par>
+        <p:cTn id="1" dur="indefinite" restart="never" nodeType="tmRoot"/>
+      </p:par>
+    </p:tnLst>
+  </p:timing>
 </p:sld>
 </file>
 

</xml_diff>